<commit_message>
Updated current PPTX and addded PPTXs as PDF
</commit_message>
<xml_diff>
--- a/Präsentationen/3_Präsentation.pptx
+++ b/Präsentationen/3_Präsentation.pptx
@@ -8,13 +8,13 @@
   <p:sldIdLst>
     <p:sldId id="256" r:id="rId3"/>
     <p:sldId id="268" r:id="rId4"/>
-    <p:sldId id="273" r:id="rId5"/>
-    <p:sldId id="257" r:id="rId6"/>
+    <p:sldId id="257" r:id="rId5"/>
+    <p:sldId id="273" r:id="rId6"/>
     <p:sldId id="271" r:id="rId7"/>
-    <p:sldId id="270" r:id="rId8"/>
-    <p:sldId id="272" r:id="rId9"/>
-    <p:sldId id="274" r:id="rId10"/>
-    <p:sldId id="269" r:id="rId11"/>
+    <p:sldId id="269" r:id="rId8"/>
+    <p:sldId id="274" r:id="rId9"/>
+    <p:sldId id="272" r:id="rId10"/>
+    <p:sldId id="270" r:id="rId11"/>
     <p:sldId id="267" r:id="rId12"/>
   </p:sldIdLst>
   <p:sldSz cx="12192000" cy="6858000"/>
@@ -396,7 +396,7 @@
           <a:p>
             <a:fld id="{78ABE3C1-DBE1-495D-B57B-2849774B866A}" type="datetimeFigureOut">
               <a:rPr lang="en-US" dirty="0"/>
-              <a:t>1/29/2021</a:t>
+              <a:t>1/31/2021</a:t>
             </a:fld>
             <a:endParaRPr lang="en-US" dirty="0"/>
           </a:p>
@@ -805,7 +805,7 @@
           <a:p>
             <a:fld id="{446C117F-5CCF-4837-BE5F-2B92066CAFAF}" type="datetimeFigureOut">
               <a:rPr lang="en-US" dirty="0"/>
-              <a:t>1/29/2021</a:t>
+              <a:t>1/31/2021</a:t>
             </a:fld>
             <a:endParaRPr lang="en-US" dirty="0"/>
           </a:p>
@@ -1136,7 +1136,7 @@
           <a:p>
             <a:fld id="{84EB90BD-B6CE-46B7-997F-7313B992CCDC}" type="datetimeFigureOut">
               <a:rPr lang="en-US" dirty="0"/>
-              <a:t>1/29/2021</a:t>
+              <a:t>1/31/2021</a:t>
             </a:fld>
             <a:endParaRPr lang="en-US" dirty="0"/>
           </a:p>
@@ -1536,7 +1536,7 @@
           <a:p>
             <a:fld id="{CDB9D11F-B188-461D-B23F-39381795C052}" type="datetimeFigureOut">
               <a:rPr lang="en-US" dirty="0"/>
-              <a:t>1/29/2021</a:t>
+              <a:t>1/31/2021</a:t>
             </a:fld>
             <a:endParaRPr lang="en-US" dirty="0"/>
           </a:p>
@@ -2099,7 +2099,7 @@
           <a:p>
             <a:fld id="{52E6D8D9-55A2-4063-B0F3-121F44549695}" type="datetimeFigureOut">
               <a:rPr lang="en-US" dirty="0"/>
-              <a:t>1/29/2021</a:t>
+              <a:t>1/31/2021</a:t>
             </a:fld>
             <a:endParaRPr lang="en-US" dirty="0"/>
           </a:p>
@@ -2775,7 +2775,7 @@
           <a:p>
             <a:fld id="{D4B24536-994D-4021-A283-9F449C0DB509}" type="datetimeFigureOut">
               <a:rPr lang="en-US" dirty="0"/>
-              <a:t>1/29/2021</a:t>
+              <a:t>1/31/2021</a:t>
             </a:fld>
             <a:endParaRPr lang="en-US" dirty="0"/>
           </a:p>
@@ -3683,7 +3683,7 @@
           <a:p>
             <a:fld id="{3CBBBB78-C96F-47B7-AB17-D852CA960AC9}" type="datetimeFigureOut">
               <a:rPr lang="en-US" dirty="0"/>
-              <a:t>1/29/2021</a:t>
+              <a:t>1/31/2021</a:t>
             </a:fld>
             <a:endParaRPr lang="en-US" dirty="0"/>
           </a:p>
@@ -3991,7 +3991,7 @@
           <a:p>
             <a:fld id="{1FA3F48C-C7C6-4055-9F49-3777875E72AE}" type="datetimeFigureOut">
               <a:rPr lang="en-US" dirty="0"/>
-              <a:t>1/29/2021</a:t>
+              <a:t>1/31/2021</a:t>
             </a:fld>
             <a:endParaRPr lang="en-US" dirty="0"/>
           </a:p>
@@ -4250,7 +4250,7 @@
           <a:p>
             <a:fld id="{6178E61D-D431-422C-9764-11DAFE33AB63}" type="datetimeFigureOut">
               <a:rPr lang="en-US" dirty="0"/>
-              <a:t>1/29/2021</a:t>
+              <a:t>1/31/2021</a:t>
             </a:fld>
             <a:endParaRPr lang="en-US" dirty="0"/>
           </a:p>
@@ -4468,7 +4468,7 @@
           <a:p>
             <a:fld id="{78ABE3C1-DBE1-495D-B57B-2849774B866A}" type="datetimeFigureOut">
               <a:rPr lang="en-US" smtClean="0"/>
-              <a:t>1/29/2021</a:t>
+              <a:t>1/31/2021</a:t>
             </a:fld>
             <a:endParaRPr lang="en-US" dirty="0"/>
           </a:p>
@@ -4666,7 +4666,7 @@
           <a:p>
             <a:fld id="{12DE42F4-6EEF-4EF7-8ED4-2208F0F89A08}" type="datetimeFigureOut">
               <a:rPr lang="en-US" smtClean="0"/>
-              <a:t>1/29/2021</a:t>
+              <a:t>1/31/2021</a:t>
             </a:fld>
             <a:endParaRPr lang="en-US" dirty="0"/>
           </a:p>
@@ -4987,7 +4987,7 @@
           <a:p>
             <a:fld id="{12DE42F4-6EEF-4EF7-8ED4-2208F0F89A08}" type="datetimeFigureOut">
               <a:rPr lang="en-US" dirty="0"/>
-              <a:t>1/29/2021</a:t>
+              <a:t>1/31/2021</a:t>
             </a:fld>
             <a:endParaRPr lang="en-US" dirty="0"/>
           </a:p>
@@ -5245,7 +5245,7 @@
           <a:p>
             <a:fld id="{30578ACC-22D6-47C1-A373-4FD133E34F3C}" type="datetimeFigureOut">
               <a:rPr lang="en-US" smtClean="0"/>
-              <a:t>1/29/2021</a:t>
+              <a:t>1/31/2021</a:t>
             </a:fld>
             <a:endParaRPr lang="en-US" dirty="0"/>
           </a:p>
@@ -5510,7 +5510,7 @@
           <a:p>
             <a:fld id="{4E5A6C69-6797-4E8A-BF37-F2C3751466E9}" type="datetimeFigureOut">
               <a:rPr lang="en-US" smtClean="0"/>
-              <a:t>1/29/2021</a:t>
+              <a:t>1/31/2021</a:t>
             </a:fld>
             <a:endParaRPr lang="en-US" dirty="0"/>
           </a:p>
@@ -5922,7 +5922,7 @@
           <a:p>
             <a:fld id="{D82014A1-A632-4878-A0D3-F52BA7563730}" type="datetimeFigureOut">
               <a:rPr lang="en-US" smtClean="0"/>
-              <a:t>1/29/2021</a:t>
+              <a:t>1/31/2021</a:t>
             </a:fld>
             <a:endParaRPr lang="en-US" dirty="0"/>
           </a:p>
@@ -6063,7 +6063,7 @@
           <a:p>
             <a:fld id="{CE99F462-093F-4566-844B-4C71F2739DA5}" type="datetimeFigureOut">
               <a:rPr lang="en-US" smtClean="0"/>
-              <a:t>1/29/2021</a:t>
+              <a:t>1/31/2021</a:t>
             </a:fld>
             <a:endParaRPr lang="en-US" dirty="0"/>
           </a:p>
@@ -6176,7 +6176,7 @@
           <a:p>
             <a:fld id="{3D24A7AC-904D-4781-85BA-7D10C17ED021}" type="datetimeFigureOut">
               <a:rPr lang="en-US" smtClean="0"/>
-              <a:t>1/29/2021</a:t>
+              <a:t>1/31/2021</a:t>
             </a:fld>
             <a:endParaRPr lang="en-US" dirty="0"/>
           </a:p>
@@ -6487,7 +6487,7 @@
           <a:p>
             <a:fld id="{E331444B-B92B-4E27-8C94-BB93EAF5CB18}" type="datetimeFigureOut">
               <a:rPr lang="en-US" smtClean="0"/>
-              <a:t>1/29/2021</a:t>
+              <a:t>1/31/2021</a:t>
             </a:fld>
             <a:endParaRPr lang="en-US" dirty="0"/>
           </a:p>
@@ -6775,7 +6775,7 @@
           <a:p>
             <a:fld id="{363EFA5E-FA76-400D-B3DC-F0BA90E6D107}" type="datetimeFigureOut">
               <a:rPr lang="en-US" smtClean="0"/>
-              <a:t>1/29/2021</a:t>
+              <a:t>1/31/2021</a:t>
             </a:fld>
             <a:endParaRPr lang="en-US" dirty="0"/>
           </a:p>
@@ -6973,7 +6973,7 @@
           <a:p>
             <a:fld id="{1FA3F48C-C7C6-4055-9F49-3777875E72AE}" type="datetimeFigureOut">
               <a:rPr lang="en-US" smtClean="0"/>
-              <a:t>1/29/2021</a:t>
+              <a:t>1/31/2021</a:t>
             </a:fld>
             <a:endParaRPr lang="en-US" dirty="0"/>
           </a:p>
@@ -7181,7 +7181,7 @@
           <a:p>
             <a:fld id="{6178E61D-D431-422C-9764-11DAFE33AB63}" type="datetimeFigureOut">
               <a:rPr lang="en-US" smtClean="0"/>
-              <a:t>1/29/2021</a:t>
+              <a:t>1/31/2021</a:t>
             </a:fld>
             <a:endParaRPr lang="en-US" dirty="0"/>
           </a:p>
@@ -7583,7 +7583,7 @@
           <a:p>
             <a:fld id="{30578ACC-22D6-47C1-A373-4FD133E34F3C}" type="datetimeFigureOut">
               <a:rPr lang="en-US" dirty="0"/>
-              <a:t>1/29/2021</a:t>
+              <a:t>1/31/2021</a:t>
             </a:fld>
             <a:endParaRPr lang="en-US" dirty="0"/>
           </a:p>
@@ -7954,7 +7954,7 @@
           <a:p>
             <a:fld id="{4E5A6C69-6797-4E8A-BF37-F2C3751466E9}" type="datetimeFigureOut">
               <a:rPr lang="en-US" dirty="0"/>
-              <a:t>1/29/2021</a:t>
+              <a:t>1/31/2021</a:t>
             </a:fld>
             <a:endParaRPr lang="en-US" dirty="0"/>
           </a:p>
@@ -8455,7 +8455,7 @@
           <a:p>
             <a:fld id="{D82014A1-A632-4878-A0D3-F52BA7563730}" type="datetimeFigureOut">
               <a:rPr lang="en-US" dirty="0"/>
-              <a:t>1/29/2021</a:t>
+              <a:t>1/31/2021</a:t>
             </a:fld>
             <a:endParaRPr lang="en-US" dirty="0"/>
           </a:p>
@@ -8707,7 +8707,7 @@
           <a:p>
             <a:fld id="{CE99F462-093F-4566-844B-4C71F2739DA5}" type="datetimeFigureOut">
               <a:rPr lang="en-US" dirty="0"/>
-              <a:t>1/29/2021</a:t>
+              <a:t>1/31/2021</a:t>
             </a:fld>
             <a:endParaRPr lang="en-US" dirty="0"/>
           </a:p>
@@ -8865,7 +8865,7 @@
           <a:p>
             <a:fld id="{3D24A7AC-904D-4781-85BA-7D10C17ED021}" type="datetimeFigureOut">
               <a:rPr lang="en-US" dirty="0"/>
-              <a:t>1/29/2021</a:t>
+              <a:t>1/31/2021</a:t>
             </a:fld>
             <a:endParaRPr lang="en-US" dirty="0"/>
           </a:p>
@@ -9250,7 +9250,7 @@
           <a:p>
             <a:fld id="{E331444B-B92B-4E27-8C94-BB93EAF5CB18}" type="datetimeFigureOut">
               <a:rPr lang="en-US" dirty="0"/>
-              <a:t>1/29/2021</a:t>
+              <a:t>1/31/2021</a:t>
             </a:fld>
             <a:endParaRPr lang="en-US" dirty="0"/>
           </a:p>
@@ -9654,7 +9654,7 @@
           <a:p>
             <a:fld id="{363EFA5E-FA76-400D-B3DC-F0BA90E6D107}" type="datetimeFigureOut">
               <a:rPr lang="en-US" dirty="0"/>
-              <a:t>1/29/2021</a:t>
+              <a:t>1/31/2021</a:t>
             </a:fld>
             <a:endParaRPr lang="en-US" dirty="0"/>
           </a:p>
@@ -9893,7 +9893,7 @@
           <a:p>
             <a:fld id="{9D6E9DEC-419B-4CC5-A080-3B06BD5A8291}" type="datetimeFigureOut">
               <a:rPr lang="en-US" dirty="0"/>
-              <a:t>1/29/2021</a:t>
+              <a:t>1/31/2021</a:t>
             </a:fld>
             <a:endParaRPr lang="en-US" dirty="0"/>
           </a:p>
@@ -10452,7 +10452,7 @@
           <a:p>
             <a:fld id="{9D6E9DEC-419B-4CC5-A080-3B06BD5A8291}" type="datetimeFigureOut">
               <a:rPr lang="en-US" smtClean="0"/>
-              <a:t>1/29/2021</a:t>
+              <a:t>1/31/2021</a:t>
             </a:fld>
             <a:endParaRPr lang="en-US" dirty="0"/>
           </a:p>
@@ -11169,16 +11169,6 @@
             </a:pPr>
             <a:r>
               <a:rPr lang="de-DE" dirty="0"/>
-              <a:t>Klassendiagramme (Zeitreise durch das Projekt) </a:t>
-            </a:r>
-          </a:p>
-          <a:p>
-            <a:pPr marL="457200" indent="-457200">
-              <a:buFont typeface="+mj-lt"/>
-              <a:buAutoNum type="arabicPeriod"/>
-            </a:pPr>
-            <a:r>
-              <a:rPr lang="de-DE" dirty="0"/>
               <a:t>Kommende Schritte (Java 2)</a:t>
             </a:r>
           </a:p>
@@ -11258,45 +11248,66 @@
           <a:p>
             <a:r>
               <a:rPr lang="de-DE" dirty="0"/>
-              <a:t>Arbeitsaktivitätsverlauf</a:t>
-            </a:r>
-          </a:p>
-        </p:txBody>
-      </p:sp>
-      <p:pic>
-        <p:nvPicPr>
-          <p:cNvPr id="9" name="Grafik 8">
+              <a:t>Was machen wir eigentlich?</a:t>
+            </a:r>
+          </a:p>
+        </p:txBody>
+      </p:sp>
+      <p:sp>
+        <p:nvSpPr>
+          <p:cNvPr id="3" name="Inhaltsplatzhalter 2">
             <a:extLst>
               <a:ext uri="{FF2B5EF4-FFF2-40B4-BE49-F238E27FC236}">
-                <a16:creationId xmlns:a16="http://schemas.microsoft.com/office/drawing/2014/main" id="{A80DE4DA-7DAD-489F-A5D5-1C9A4BB3C6D0}"/>
+                <a16:creationId xmlns:a16="http://schemas.microsoft.com/office/drawing/2014/main" id="{D05EB91A-C650-434F-B579-8F362D609943}"/>
               </a:ext>
             </a:extLst>
           </p:cNvPr>
-          <p:cNvPicPr>
-            <a:picLocks noChangeAspect="1"/>
-          </p:cNvPicPr>
-          <p:nvPr/>
-        </p:nvPicPr>
-        <p:blipFill>
-          <a:blip r:embed="rId2"/>
-          <a:stretch>
-            <a:fillRect/>
-          </a:stretch>
-        </p:blipFill>
-        <p:spPr>
-          <a:xfrm>
-            <a:off x="998610" y="2370741"/>
-            <a:ext cx="8977281" cy="3335794"/>
-          </a:xfrm>
-          <a:prstGeom prst="rect">
-            <a:avLst/>
-          </a:prstGeom>
-        </p:spPr>
-      </p:pic>
+          <p:cNvSpPr>
+            <a:spLocks noGrp="1"/>
+          </p:cNvSpPr>
+          <p:nvPr>
+            <p:ph idx="1"/>
+          </p:nvPr>
+        </p:nvSpPr>
+        <p:spPr/>
+        <p:txBody>
+          <a:bodyPr>
+            <a:normAutofit/>
+          </a:bodyPr>
+          <a:lstStyle/>
+          <a:p>
+            <a:r>
+              <a:rPr lang="de-DE" dirty="0"/>
+              <a:t>Kartenlernsystem für Studierende und Lehrende</a:t>
+            </a:r>
+          </a:p>
+          <a:p>
+            <a:r>
+              <a:rPr lang="de-DE" dirty="0"/>
+              <a:t>Zum erstellen und austauschen von Karteikarten und </a:t>
+            </a:r>
+            <a:r>
+              <a:rPr lang="de-DE" dirty="0" err="1"/>
+              <a:t>LernSets</a:t>
+            </a:r>
+            <a:endParaRPr lang="de-DE" dirty="0"/>
+          </a:p>
+          <a:p>
+            <a:r>
+              <a:rPr lang="de-DE" dirty="0" err="1"/>
+              <a:t>aiCard</a:t>
+            </a:r>
+            <a:endParaRPr lang="de-DE" dirty="0"/>
+          </a:p>
+          <a:p>
+            <a:endParaRPr lang="de-DE" dirty="0"/>
+          </a:p>
+        </p:txBody>
+      </p:sp>
     </p:spTree>
     <p:extLst>
       <p:ext uri="{BB962C8B-B14F-4D97-AF65-F5344CB8AC3E}">
-        <p14:creationId xmlns:p14="http://schemas.microsoft.com/office/powerpoint/2010/main" val="1093404368"/>
+        <p14:creationId xmlns:p14="http://schemas.microsoft.com/office/powerpoint/2010/main" val="386117792"/>
       </p:ext>
     </p:extLst>
   </p:cSld>
@@ -11346,66 +11357,45 @@
           <a:p>
             <a:r>
               <a:rPr lang="de-DE" dirty="0"/>
-              <a:t>Was machen wir eigentlich?</a:t>
-            </a:r>
-          </a:p>
-        </p:txBody>
-      </p:sp>
-      <p:sp>
-        <p:nvSpPr>
-          <p:cNvPr id="3" name="Inhaltsplatzhalter 2">
+              <a:t>Arbeitsaktivitätsverlauf</a:t>
+            </a:r>
+          </a:p>
+        </p:txBody>
+      </p:sp>
+      <p:pic>
+        <p:nvPicPr>
+          <p:cNvPr id="6" name="Grafik 5">
             <a:extLst>
               <a:ext uri="{FF2B5EF4-FFF2-40B4-BE49-F238E27FC236}">
-                <a16:creationId xmlns:a16="http://schemas.microsoft.com/office/drawing/2014/main" id="{D05EB91A-C650-434F-B579-8F362D609943}"/>
+                <a16:creationId xmlns:a16="http://schemas.microsoft.com/office/drawing/2014/main" id="{E1A57EF6-AA46-424B-982D-5EF1C805CDF5}"/>
               </a:ext>
             </a:extLst>
           </p:cNvPr>
-          <p:cNvSpPr>
-            <a:spLocks noGrp="1"/>
-          </p:cNvSpPr>
-          <p:nvPr>
-            <p:ph idx="1"/>
-          </p:nvPr>
-        </p:nvSpPr>
-        <p:spPr/>
-        <p:txBody>
-          <a:bodyPr>
-            <a:normAutofit/>
-          </a:bodyPr>
-          <a:lstStyle/>
-          <a:p>
-            <a:r>
-              <a:rPr lang="de-DE" dirty="0"/>
-              <a:t>Kartenlernsystem für Studierende und Lehrende</a:t>
-            </a:r>
-          </a:p>
-          <a:p>
-            <a:r>
-              <a:rPr lang="de-DE" dirty="0"/>
-              <a:t>Zum erstellen und austauschen von Karteikarten und </a:t>
-            </a:r>
-            <a:r>
-              <a:rPr lang="de-DE" dirty="0" err="1"/>
-              <a:t>LernSets</a:t>
-            </a:r>
-            <a:endParaRPr lang="de-DE" dirty="0"/>
-          </a:p>
-          <a:p>
-            <a:r>
-              <a:rPr lang="de-DE" dirty="0" err="1"/>
-              <a:t>aiCard</a:t>
-            </a:r>
-            <a:endParaRPr lang="de-DE" dirty="0"/>
-          </a:p>
-          <a:p>
-            <a:endParaRPr lang="de-DE" dirty="0"/>
-          </a:p>
-        </p:txBody>
-      </p:sp>
+          <p:cNvPicPr>
+            <a:picLocks noChangeAspect="1"/>
+          </p:cNvPicPr>
+          <p:nvPr/>
+        </p:nvPicPr>
+        <p:blipFill>
+          <a:blip r:embed="rId2"/>
+          <a:stretch>
+            <a:fillRect/>
+          </a:stretch>
+        </p:blipFill>
+        <p:spPr>
+          <a:xfrm>
+            <a:off x="648526" y="2271092"/>
+            <a:ext cx="10894948" cy="4185731"/>
+          </a:xfrm>
+          <a:prstGeom prst="rect">
+            <a:avLst/>
+          </a:prstGeom>
+        </p:spPr>
+      </p:pic>
     </p:spTree>
     <p:extLst>
       <p:ext uri="{BB962C8B-B14F-4D97-AF65-F5344CB8AC3E}">
-        <p14:creationId xmlns:p14="http://schemas.microsoft.com/office/powerpoint/2010/main" val="386117792"/>
+        <p14:creationId xmlns:p14="http://schemas.microsoft.com/office/powerpoint/2010/main" val="1093404368"/>
       </p:ext>
     </p:extLst>
   </p:cSld>
@@ -11553,453 +11543,6 @@
 </file>
 
 <file path=ppt/slides/slide6.xml><?xml version="1.0" encoding="utf-8"?>
-<p:sld xmlns:a="http://schemas.openxmlformats.org/drawingml/2006/main" xmlns:r="http://schemas.openxmlformats.org/officeDocument/2006/relationships" xmlns:p="http://schemas.openxmlformats.org/presentationml/2006/main">
-  <p:cSld>
-    <p:spTree>
-      <p:nvGrpSpPr>
-        <p:cNvPr id="1" name=""/>
-        <p:cNvGrpSpPr/>
-        <p:nvPr/>
-      </p:nvGrpSpPr>
-      <p:grpSpPr>
-        <a:xfrm>
-          <a:off x="0" y="0"/>
-          <a:ext cx="0" cy="0"/>
-          <a:chOff x="0" y="0"/>
-          <a:chExt cx="0" cy="0"/>
-        </a:xfrm>
-      </p:grpSpPr>
-      <p:sp>
-        <p:nvSpPr>
-          <p:cNvPr id="2" name="Titel 1">
-            <a:extLst>
-              <a:ext uri="{FF2B5EF4-FFF2-40B4-BE49-F238E27FC236}">
-                <a16:creationId xmlns:a16="http://schemas.microsoft.com/office/drawing/2014/main" id="{62F14DB5-6288-49EC-85DB-36DACB1EE0C4}"/>
-              </a:ext>
-            </a:extLst>
-          </p:cNvPr>
-          <p:cNvSpPr>
-            <a:spLocks noGrp="1"/>
-          </p:cNvSpPr>
-          <p:nvPr>
-            <p:ph type="title"/>
-          </p:nvPr>
-        </p:nvSpPr>
-        <p:spPr/>
-        <p:txBody>
-          <a:bodyPr/>
-          <a:lstStyle/>
-          <a:p>
-            <a:r>
-              <a:rPr lang="de-DE" dirty="0" err="1"/>
-              <a:t>Lessons</a:t>
-            </a:r>
-            <a:r>
-              <a:rPr lang="de-DE" dirty="0"/>
-              <a:t> </a:t>
-            </a:r>
-            <a:r>
-              <a:rPr lang="de-DE" dirty="0" err="1"/>
-              <a:t>Learned</a:t>
-            </a:r>
-            <a:endParaRPr lang="de-DE" dirty="0"/>
-          </a:p>
-        </p:txBody>
-      </p:sp>
-      <p:sp>
-        <p:nvSpPr>
-          <p:cNvPr id="3" name="Inhaltsplatzhalter 2">
-            <a:extLst>
-              <a:ext uri="{FF2B5EF4-FFF2-40B4-BE49-F238E27FC236}">
-                <a16:creationId xmlns:a16="http://schemas.microsoft.com/office/drawing/2014/main" id="{D05EB91A-C650-434F-B579-8F362D609943}"/>
-              </a:ext>
-            </a:extLst>
-          </p:cNvPr>
-          <p:cNvSpPr>
-            <a:spLocks noGrp="1"/>
-          </p:cNvSpPr>
-          <p:nvPr>
-            <p:ph idx="1"/>
-          </p:nvPr>
-        </p:nvSpPr>
-        <p:spPr/>
-        <p:txBody>
-          <a:bodyPr>
-            <a:normAutofit/>
-          </a:bodyPr>
-          <a:lstStyle/>
-          <a:p>
-            <a:r>
-              <a:rPr lang="de-DE" dirty="0"/>
-              <a:t>Gruppenarbeit ist kompliziert</a:t>
-            </a:r>
-          </a:p>
-          <a:p>
-            <a:r>
-              <a:rPr lang="de-DE" dirty="0"/>
-              <a:t>Gruppenarbeit ist wichtig, weil wir viel voneinander gelernt haben</a:t>
-            </a:r>
-          </a:p>
-          <a:p>
-            <a:r>
-              <a:rPr lang="de-DE" dirty="0"/>
-              <a:t>Gegenseitig geholfen bei Herausforderungen</a:t>
-            </a:r>
-          </a:p>
-          <a:p>
-            <a:r>
-              <a:rPr lang="de-DE" dirty="0"/>
-              <a:t>Herausforderung durch das Online-Semester (Kommunikation und Koordination)</a:t>
-            </a:r>
-          </a:p>
-          <a:p>
-            <a:r>
-              <a:rPr lang="de-DE" dirty="0"/>
-              <a:t>Wir haben das Projekt ohne Sanktionen durchgestanden</a:t>
-            </a:r>
-          </a:p>
-          <a:p>
-            <a:r>
-              <a:rPr lang="de-DE" dirty="0"/>
-              <a:t>Gute Protokollführung ist sehr wichtig</a:t>
-            </a:r>
-          </a:p>
-          <a:p>
-            <a:endParaRPr lang="de-DE" dirty="0"/>
-          </a:p>
-        </p:txBody>
-      </p:sp>
-    </p:spTree>
-    <p:extLst>
-      <p:ext uri="{BB962C8B-B14F-4D97-AF65-F5344CB8AC3E}">
-        <p14:creationId xmlns:p14="http://schemas.microsoft.com/office/powerpoint/2010/main" val="2457349450"/>
-      </p:ext>
-    </p:extLst>
-  </p:cSld>
-  <p:clrMapOvr>
-    <a:masterClrMapping/>
-  </p:clrMapOvr>
-</p:sld>
-</file>
-
-<file path=ppt/slides/slide7.xml><?xml version="1.0" encoding="utf-8"?>
-<p:sld xmlns:a="http://schemas.openxmlformats.org/drawingml/2006/main" xmlns:r="http://schemas.openxmlformats.org/officeDocument/2006/relationships" xmlns:p="http://schemas.openxmlformats.org/presentationml/2006/main">
-  <p:cSld>
-    <p:spTree>
-      <p:nvGrpSpPr>
-        <p:cNvPr id="1" name=""/>
-        <p:cNvGrpSpPr/>
-        <p:nvPr/>
-      </p:nvGrpSpPr>
-      <p:grpSpPr>
-        <a:xfrm>
-          <a:off x="0" y="0"/>
-          <a:ext cx="0" cy="0"/>
-          <a:chOff x="0" y="0"/>
-          <a:chExt cx="0" cy="0"/>
-        </a:xfrm>
-      </p:grpSpPr>
-      <p:sp>
-        <p:nvSpPr>
-          <p:cNvPr id="2" name="Titel 1">
-            <a:extLst>
-              <a:ext uri="{FF2B5EF4-FFF2-40B4-BE49-F238E27FC236}">
-                <a16:creationId xmlns:a16="http://schemas.microsoft.com/office/drawing/2014/main" id="{62F14DB5-6288-49EC-85DB-36DACB1EE0C4}"/>
-              </a:ext>
-            </a:extLst>
-          </p:cNvPr>
-          <p:cNvSpPr>
-            <a:spLocks noGrp="1"/>
-          </p:cNvSpPr>
-          <p:nvPr>
-            <p:ph type="title"/>
-          </p:nvPr>
-        </p:nvSpPr>
-        <p:spPr/>
-        <p:txBody>
-          <a:bodyPr/>
-          <a:lstStyle/>
-          <a:p>
-            <a:r>
-              <a:rPr lang="de-DE" dirty="0" err="1"/>
-              <a:t>Lessons</a:t>
-            </a:r>
-            <a:r>
-              <a:rPr lang="de-DE" dirty="0"/>
-              <a:t> </a:t>
-            </a:r>
-            <a:r>
-              <a:rPr lang="de-DE" dirty="0" err="1"/>
-              <a:t>Learned</a:t>
-            </a:r>
-            <a:endParaRPr lang="de-DE" dirty="0"/>
-          </a:p>
-        </p:txBody>
-      </p:sp>
-      <p:sp>
-        <p:nvSpPr>
-          <p:cNvPr id="3" name="Inhaltsplatzhalter 2">
-            <a:extLst>
-              <a:ext uri="{FF2B5EF4-FFF2-40B4-BE49-F238E27FC236}">
-                <a16:creationId xmlns:a16="http://schemas.microsoft.com/office/drawing/2014/main" id="{D05EB91A-C650-434F-B579-8F362D609943}"/>
-              </a:ext>
-            </a:extLst>
-          </p:cNvPr>
-          <p:cNvSpPr>
-            <a:spLocks noGrp="1"/>
-          </p:cNvSpPr>
-          <p:nvPr>
-            <p:ph idx="1"/>
-          </p:nvPr>
-        </p:nvSpPr>
-        <p:spPr/>
-        <p:txBody>
-          <a:bodyPr>
-            <a:normAutofit/>
-          </a:bodyPr>
-          <a:lstStyle/>
-          <a:p>
-            <a:r>
-              <a:rPr lang="de-DE" dirty="0"/>
-              <a:t>GitHub, Probleme am Anfang und bei Push ohne Pull</a:t>
-            </a:r>
-          </a:p>
-          <a:p>
-            <a:r>
-              <a:rPr lang="de-DE" dirty="0"/>
-              <a:t>JAVA </a:t>
-            </a:r>
-          </a:p>
-          <a:p>
-            <a:r>
-              <a:rPr lang="de-DE" dirty="0"/>
-              <a:t>Test helfen sehr bei der Programmierung (</a:t>
-            </a:r>
-            <a:r>
-              <a:rPr lang="de-DE" dirty="0" err="1"/>
-              <a:t>Testdriven</a:t>
-            </a:r>
-            <a:r>
-              <a:rPr lang="de-DE" dirty="0"/>
-              <a:t> </a:t>
-            </a:r>
-            <a:r>
-              <a:rPr lang="de-DE" dirty="0" err="1"/>
-              <a:t>development</a:t>
-            </a:r>
-            <a:r>
-              <a:rPr lang="de-DE" dirty="0"/>
-              <a:t>)</a:t>
-            </a:r>
-          </a:p>
-          <a:p>
-            <a:r>
-              <a:rPr lang="de-DE" dirty="0"/>
-              <a:t>Die größte Schwierigkeit bei diesem Projekt war das Umdenken von der Datenbankbasierten Logik</a:t>
-            </a:r>
-          </a:p>
-          <a:p>
-            <a:endParaRPr lang="de-DE" dirty="0"/>
-          </a:p>
-          <a:p>
-            <a:endParaRPr lang="de-DE" dirty="0">
-              <a:sym typeface="Wingdings" panose="05000000000000000000" pitchFamily="2" charset="2"/>
-            </a:endParaRPr>
-          </a:p>
-          <a:p>
-            <a:endParaRPr lang="de-DE" dirty="0">
-              <a:sym typeface="Wingdings" panose="05000000000000000000" pitchFamily="2" charset="2"/>
-            </a:endParaRPr>
-          </a:p>
-          <a:p>
-            <a:endParaRPr lang="de-DE" dirty="0"/>
-          </a:p>
-          <a:p>
-            <a:endParaRPr lang="de-DE" dirty="0"/>
-          </a:p>
-        </p:txBody>
-      </p:sp>
-    </p:spTree>
-    <p:extLst>
-      <p:ext uri="{BB962C8B-B14F-4D97-AF65-F5344CB8AC3E}">
-        <p14:creationId xmlns:p14="http://schemas.microsoft.com/office/powerpoint/2010/main" val="1681388264"/>
-      </p:ext>
-    </p:extLst>
-  </p:cSld>
-  <p:clrMapOvr>
-    <a:masterClrMapping/>
-  </p:clrMapOvr>
-</p:sld>
-</file>
-
-<file path=ppt/slides/slide8.xml><?xml version="1.0" encoding="utf-8"?>
-<p:sld xmlns:a="http://schemas.openxmlformats.org/drawingml/2006/main" xmlns:r="http://schemas.openxmlformats.org/officeDocument/2006/relationships" xmlns:p="http://schemas.openxmlformats.org/presentationml/2006/main">
-  <p:cSld>
-    <p:spTree>
-      <p:nvGrpSpPr>
-        <p:cNvPr id="1" name=""/>
-        <p:cNvGrpSpPr/>
-        <p:nvPr/>
-      </p:nvGrpSpPr>
-      <p:grpSpPr>
-        <a:xfrm>
-          <a:off x="0" y="0"/>
-          <a:ext cx="0" cy="0"/>
-          <a:chOff x="0" y="0"/>
-          <a:chExt cx="0" cy="0"/>
-        </a:xfrm>
-      </p:grpSpPr>
-      <p:sp>
-        <p:nvSpPr>
-          <p:cNvPr id="2" name="Titel 1">
-            <a:extLst>
-              <a:ext uri="{FF2B5EF4-FFF2-40B4-BE49-F238E27FC236}">
-                <a16:creationId xmlns:a16="http://schemas.microsoft.com/office/drawing/2014/main" id="{62F14DB5-6288-49EC-85DB-36DACB1EE0C4}"/>
-              </a:ext>
-            </a:extLst>
-          </p:cNvPr>
-          <p:cNvSpPr>
-            <a:spLocks noGrp="1"/>
-          </p:cNvSpPr>
-          <p:nvPr>
-            <p:ph type="title"/>
-          </p:nvPr>
-        </p:nvSpPr>
-        <p:spPr/>
-        <p:txBody>
-          <a:bodyPr/>
-          <a:lstStyle/>
-          <a:p>
-            <a:r>
-              <a:rPr lang="de-DE" dirty="0"/>
-              <a:t>Tests </a:t>
-            </a:r>
-            <a:r>
-              <a:rPr lang="de-DE" b="1" i="0" dirty="0">
-                <a:solidFill>
-                  <a:srgbClr val="00B050"/>
-                </a:solidFill>
-                <a:effectLst/>
-                <a:latin typeface="Abadi" panose="020B0604020202020204" pitchFamily="34" charset="0"/>
-              </a:rPr>
-              <a:t>√</a:t>
-            </a:r>
-            <a:endParaRPr lang="de-DE" b="1" dirty="0">
-              <a:solidFill>
-                <a:srgbClr val="00B050"/>
-              </a:solidFill>
-              <a:latin typeface="Abadi" panose="020B0604020202020204" pitchFamily="34" charset="0"/>
-            </a:endParaRPr>
-          </a:p>
-        </p:txBody>
-      </p:sp>
-      <p:sp>
-        <p:nvSpPr>
-          <p:cNvPr id="3" name="Inhaltsplatzhalter 2">
-            <a:extLst>
-              <a:ext uri="{FF2B5EF4-FFF2-40B4-BE49-F238E27FC236}">
-                <a16:creationId xmlns:a16="http://schemas.microsoft.com/office/drawing/2014/main" id="{D05EB91A-C650-434F-B579-8F362D609943}"/>
-              </a:ext>
-            </a:extLst>
-          </p:cNvPr>
-          <p:cNvSpPr>
-            <a:spLocks noGrp="1"/>
-          </p:cNvSpPr>
-          <p:nvPr>
-            <p:ph idx="1"/>
-          </p:nvPr>
-        </p:nvSpPr>
-        <p:spPr/>
-        <p:txBody>
-          <a:bodyPr>
-            <a:normAutofit/>
-          </a:bodyPr>
-          <a:lstStyle/>
-          <a:p>
-            <a:r>
-              <a:rPr lang="de-DE" dirty="0"/>
-              <a:t>GitHub, Probleme am Anfang und bei Push ohne Pull</a:t>
-            </a:r>
-          </a:p>
-          <a:p>
-            <a:endParaRPr lang="de-DE" dirty="0"/>
-          </a:p>
-        </p:txBody>
-      </p:sp>
-      <p:pic>
-        <p:nvPicPr>
-          <p:cNvPr id="5" name="Grafik 4">
-            <a:extLst>
-              <a:ext uri="{FF2B5EF4-FFF2-40B4-BE49-F238E27FC236}">
-                <a16:creationId xmlns:a16="http://schemas.microsoft.com/office/drawing/2014/main" id="{60B3462D-BD37-4C2A-8E6A-2E3F5B6ADF79}"/>
-              </a:ext>
-            </a:extLst>
-          </p:cNvPr>
-          <p:cNvPicPr>
-            <a:picLocks noChangeAspect="1"/>
-          </p:cNvPicPr>
-          <p:nvPr/>
-        </p:nvPicPr>
-        <p:blipFill>
-          <a:blip r:embed="rId2"/>
-          <a:stretch>
-            <a:fillRect/>
-          </a:stretch>
-        </p:blipFill>
-        <p:spPr>
-          <a:xfrm>
-            <a:off x="90634" y="2370070"/>
-            <a:ext cx="7115175" cy="4352925"/>
-          </a:xfrm>
-          <a:prstGeom prst="rect">
-            <a:avLst/>
-          </a:prstGeom>
-        </p:spPr>
-      </p:pic>
-      <p:pic>
-        <p:nvPicPr>
-          <p:cNvPr id="9" name="Grafik 8">
-            <a:extLst>
-              <a:ext uri="{FF2B5EF4-FFF2-40B4-BE49-F238E27FC236}">
-                <a16:creationId xmlns:a16="http://schemas.microsoft.com/office/drawing/2014/main" id="{491CEC6A-B5DC-49F6-92DA-B1ADAFE6EFD6}"/>
-              </a:ext>
-            </a:extLst>
-          </p:cNvPr>
-          <p:cNvPicPr>
-            <a:picLocks noChangeAspect="1"/>
-          </p:cNvPicPr>
-          <p:nvPr/>
-        </p:nvPicPr>
-        <p:blipFill>
-          <a:blip r:embed="rId3"/>
-          <a:stretch>
-            <a:fillRect/>
-          </a:stretch>
-        </p:blipFill>
-        <p:spPr>
-          <a:xfrm>
-            <a:off x="4447645" y="2377799"/>
-            <a:ext cx="7653721" cy="4352925"/>
-          </a:xfrm>
-          <a:prstGeom prst="rect">
-            <a:avLst/>
-          </a:prstGeom>
-        </p:spPr>
-      </p:pic>
-    </p:spTree>
-    <p:extLst>
-      <p:ext uri="{BB962C8B-B14F-4D97-AF65-F5344CB8AC3E}">
-        <p14:creationId xmlns:p14="http://schemas.microsoft.com/office/powerpoint/2010/main" val="1775440726"/>
-      </p:ext>
-    </p:extLst>
-  </p:cSld>
-  <p:clrMapOvr>
-    <a:masterClrMapping/>
-  </p:clrMapOvr>
-</p:sld>
-</file>
-
-<file path=ppt/slides/slide9.xml><?xml version="1.0" encoding="utf-8"?>
 <p:sld xmlns:a="http://schemas.openxmlformats.org/drawingml/2006/main" xmlns:r="http://schemas.openxmlformats.org/officeDocument/2006/relationships" xmlns:p="http://schemas.openxmlformats.org/presentationml/2006/main">
   <p:cSld>
     <p:bg>
@@ -12199,6 +11742,437 @@
   </p:cSld>
   <p:clrMapOvr>
     <a:overrideClrMapping bg1="lt1" tx1="dk1" bg2="lt2" tx2="dk2" accent1="accent1" accent2="accent2" accent3="accent3" accent4="accent4" accent5="accent5" accent6="accent6" hlink="hlink" folHlink="folHlink"/>
+  </p:clrMapOvr>
+</p:sld>
+</file>
+
+<file path=ppt/slides/slide7.xml><?xml version="1.0" encoding="utf-8"?>
+<p:sld xmlns:a="http://schemas.openxmlformats.org/drawingml/2006/main" xmlns:r="http://schemas.openxmlformats.org/officeDocument/2006/relationships" xmlns:p="http://schemas.openxmlformats.org/presentationml/2006/main">
+  <p:cSld>
+    <p:spTree>
+      <p:nvGrpSpPr>
+        <p:cNvPr id="1" name=""/>
+        <p:cNvGrpSpPr/>
+        <p:nvPr/>
+      </p:nvGrpSpPr>
+      <p:grpSpPr>
+        <a:xfrm>
+          <a:off x="0" y="0"/>
+          <a:ext cx="0" cy="0"/>
+          <a:chOff x="0" y="0"/>
+          <a:chExt cx="0" cy="0"/>
+        </a:xfrm>
+      </p:grpSpPr>
+      <p:sp>
+        <p:nvSpPr>
+          <p:cNvPr id="2" name="Titel 1">
+            <a:extLst>
+              <a:ext uri="{FF2B5EF4-FFF2-40B4-BE49-F238E27FC236}">
+                <a16:creationId xmlns:a16="http://schemas.microsoft.com/office/drawing/2014/main" id="{62F14DB5-6288-49EC-85DB-36DACB1EE0C4}"/>
+              </a:ext>
+            </a:extLst>
+          </p:cNvPr>
+          <p:cNvSpPr>
+            <a:spLocks noGrp="1"/>
+          </p:cNvSpPr>
+          <p:nvPr>
+            <p:ph type="title"/>
+          </p:nvPr>
+        </p:nvSpPr>
+        <p:spPr/>
+        <p:txBody>
+          <a:bodyPr/>
+          <a:lstStyle/>
+          <a:p>
+            <a:r>
+              <a:rPr lang="de-DE" dirty="0"/>
+              <a:t>Tests </a:t>
+            </a:r>
+            <a:r>
+              <a:rPr lang="de-DE" b="1" i="0" dirty="0">
+                <a:solidFill>
+                  <a:srgbClr val="00B050"/>
+                </a:solidFill>
+                <a:effectLst/>
+                <a:latin typeface="Abadi" panose="020B0604020202020204" pitchFamily="34" charset="0"/>
+              </a:rPr>
+              <a:t>√</a:t>
+            </a:r>
+            <a:endParaRPr lang="de-DE" b="1" dirty="0">
+              <a:solidFill>
+                <a:srgbClr val="00B050"/>
+              </a:solidFill>
+              <a:latin typeface="Abadi" panose="020B0604020202020204" pitchFamily="34" charset="0"/>
+            </a:endParaRPr>
+          </a:p>
+        </p:txBody>
+      </p:sp>
+      <p:sp>
+        <p:nvSpPr>
+          <p:cNvPr id="3" name="Inhaltsplatzhalter 2">
+            <a:extLst>
+              <a:ext uri="{FF2B5EF4-FFF2-40B4-BE49-F238E27FC236}">
+                <a16:creationId xmlns:a16="http://schemas.microsoft.com/office/drawing/2014/main" id="{D05EB91A-C650-434F-B579-8F362D609943}"/>
+              </a:ext>
+            </a:extLst>
+          </p:cNvPr>
+          <p:cNvSpPr>
+            <a:spLocks noGrp="1"/>
+          </p:cNvSpPr>
+          <p:nvPr>
+            <p:ph idx="1"/>
+          </p:nvPr>
+        </p:nvSpPr>
+        <p:spPr/>
+        <p:txBody>
+          <a:bodyPr>
+            <a:normAutofit/>
+          </a:bodyPr>
+          <a:lstStyle/>
+          <a:p>
+            <a:r>
+              <a:rPr lang="de-DE" dirty="0"/>
+              <a:t>GitHub, Probleme am Anfang und bei Push ohne Pull</a:t>
+            </a:r>
+          </a:p>
+          <a:p>
+            <a:endParaRPr lang="de-DE" dirty="0"/>
+          </a:p>
+        </p:txBody>
+      </p:sp>
+      <p:pic>
+        <p:nvPicPr>
+          <p:cNvPr id="5" name="Grafik 4">
+            <a:extLst>
+              <a:ext uri="{FF2B5EF4-FFF2-40B4-BE49-F238E27FC236}">
+                <a16:creationId xmlns:a16="http://schemas.microsoft.com/office/drawing/2014/main" id="{60B3462D-BD37-4C2A-8E6A-2E3F5B6ADF79}"/>
+              </a:ext>
+            </a:extLst>
+          </p:cNvPr>
+          <p:cNvPicPr>
+            <a:picLocks noChangeAspect="1"/>
+          </p:cNvPicPr>
+          <p:nvPr/>
+        </p:nvPicPr>
+        <p:blipFill>
+          <a:blip r:embed="rId2"/>
+          <a:stretch>
+            <a:fillRect/>
+          </a:stretch>
+        </p:blipFill>
+        <p:spPr>
+          <a:xfrm>
+            <a:off x="90634" y="2370070"/>
+            <a:ext cx="7115175" cy="4352925"/>
+          </a:xfrm>
+          <a:prstGeom prst="rect">
+            <a:avLst/>
+          </a:prstGeom>
+        </p:spPr>
+      </p:pic>
+      <p:pic>
+        <p:nvPicPr>
+          <p:cNvPr id="9" name="Grafik 8">
+            <a:extLst>
+              <a:ext uri="{FF2B5EF4-FFF2-40B4-BE49-F238E27FC236}">
+                <a16:creationId xmlns:a16="http://schemas.microsoft.com/office/drawing/2014/main" id="{491CEC6A-B5DC-49F6-92DA-B1ADAFE6EFD6}"/>
+              </a:ext>
+            </a:extLst>
+          </p:cNvPr>
+          <p:cNvPicPr>
+            <a:picLocks noChangeAspect="1"/>
+          </p:cNvPicPr>
+          <p:nvPr/>
+        </p:nvPicPr>
+        <p:blipFill>
+          <a:blip r:embed="rId3"/>
+          <a:stretch>
+            <a:fillRect/>
+          </a:stretch>
+        </p:blipFill>
+        <p:spPr>
+          <a:xfrm>
+            <a:off x="4447645" y="2377799"/>
+            <a:ext cx="7653721" cy="4352925"/>
+          </a:xfrm>
+          <a:prstGeom prst="rect">
+            <a:avLst/>
+          </a:prstGeom>
+        </p:spPr>
+      </p:pic>
+    </p:spTree>
+    <p:extLst>
+      <p:ext uri="{BB962C8B-B14F-4D97-AF65-F5344CB8AC3E}">
+        <p14:creationId xmlns:p14="http://schemas.microsoft.com/office/powerpoint/2010/main" val="1775440726"/>
+      </p:ext>
+    </p:extLst>
+  </p:cSld>
+  <p:clrMapOvr>
+    <a:masterClrMapping/>
+  </p:clrMapOvr>
+</p:sld>
+</file>
+
+<file path=ppt/slides/slide8.xml><?xml version="1.0" encoding="utf-8"?>
+<p:sld xmlns:a="http://schemas.openxmlformats.org/drawingml/2006/main" xmlns:r="http://schemas.openxmlformats.org/officeDocument/2006/relationships" xmlns:p="http://schemas.openxmlformats.org/presentationml/2006/main">
+  <p:cSld>
+    <p:spTree>
+      <p:nvGrpSpPr>
+        <p:cNvPr id="1" name=""/>
+        <p:cNvGrpSpPr/>
+        <p:nvPr/>
+      </p:nvGrpSpPr>
+      <p:grpSpPr>
+        <a:xfrm>
+          <a:off x="0" y="0"/>
+          <a:ext cx="0" cy="0"/>
+          <a:chOff x="0" y="0"/>
+          <a:chExt cx="0" cy="0"/>
+        </a:xfrm>
+      </p:grpSpPr>
+      <p:sp>
+        <p:nvSpPr>
+          <p:cNvPr id="2" name="Titel 1">
+            <a:extLst>
+              <a:ext uri="{FF2B5EF4-FFF2-40B4-BE49-F238E27FC236}">
+                <a16:creationId xmlns:a16="http://schemas.microsoft.com/office/drawing/2014/main" id="{62F14DB5-6288-49EC-85DB-36DACB1EE0C4}"/>
+              </a:ext>
+            </a:extLst>
+          </p:cNvPr>
+          <p:cNvSpPr>
+            <a:spLocks noGrp="1"/>
+          </p:cNvSpPr>
+          <p:nvPr>
+            <p:ph type="title"/>
+          </p:nvPr>
+        </p:nvSpPr>
+        <p:spPr/>
+        <p:txBody>
+          <a:bodyPr/>
+          <a:lstStyle/>
+          <a:p>
+            <a:r>
+              <a:rPr lang="de-DE" dirty="0" err="1"/>
+              <a:t>Lessons</a:t>
+            </a:r>
+            <a:r>
+              <a:rPr lang="de-DE" dirty="0"/>
+              <a:t> </a:t>
+            </a:r>
+            <a:r>
+              <a:rPr lang="de-DE" dirty="0" err="1"/>
+              <a:t>Learned</a:t>
+            </a:r>
+            <a:endParaRPr lang="de-DE" dirty="0"/>
+          </a:p>
+        </p:txBody>
+      </p:sp>
+      <p:sp>
+        <p:nvSpPr>
+          <p:cNvPr id="3" name="Inhaltsplatzhalter 2">
+            <a:extLst>
+              <a:ext uri="{FF2B5EF4-FFF2-40B4-BE49-F238E27FC236}">
+                <a16:creationId xmlns:a16="http://schemas.microsoft.com/office/drawing/2014/main" id="{D05EB91A-C650-434F-B579-8F362D609943}"/>
+              </a:ext>
+            </a:extLst>
+          </p:cNvPr>
+          <p:cNvSpPr>
+            <a:spLocks noGrp="1"/>
+          </p:cNvSpPr>
+          <p:nvPr>
+            <p:ph idx="1"/>
+          </p:nvPr>
+        </p:nvSpPr>
+        <p:spPr/>
+        <p:txBody>
+          <a:bodyPr>
+            <a:normAutofit/>
+          </a:bodyPr>
+          <a:lstStyle/>
+          <a:p>
+            <a:r>
+              <a:rPr lang="de-DE" dirty="0"/>
+              <a:t>GitHub, Probleme am Anfang und bei Push ohne Pull</a:t>
+            </a:r>
+          </a:p>
+          <a:p>
+            <a:r>
+              <a:rPr lang="de-DE" dirty="0"/>
+              <a:t>JAVA </a:t>
+            </a:r>
+          </a:p>
+          <a:p>
+            <a:r>
+              <a:rPr lang="de-DE" dirty="0"/>
+              <a:t>Test helfen sehr bei der Programmierung</a:t>
+            </a:r>
+          </a:p>
+          <a:p>
+            <a:r>
+              <a:rPr lang="de-DE" dirty="0"/>
+              <a:t>Die größte Schwierigkeit bei diesem Projekt war das Umdenken von der Datenbankbasierten Logik</a:t>
+            </a:r>
+          </a:p>
+          <a:p>
+            <a:endParaRPr lang="de-DE" dirty="0"/>
+          </a:p>
+          <a:p>
+            <a:endParaRPr lang="de-DE" dirty="0">
+              <a:sym typeface="Wingdings" panose="05000000000000000000" pitchFamily="2" charset="2"/>
+            </a:endParaRPr>
+          </a:p>
+          <a:p>
+            <a:endParaRPr lang="de-DE" dirty="0">
+              <a:sym typeface="Wingdings" panose="05000000000000000000" pitchFamily="2" charset="2"/>
+            </a:endParaRPr>
+          </a:p>
+          <a:p>
+            <a:endParaRPr lang="de-DE" dirty="0"/>
+          </a:p>
+          <a:p>
+            <a:endParaRPr lang="de-DE" dirty="0"/>
+          </a:p>
+        </p:txBody>
+      </p:sp>
+    </p:spTree>
+    <p:extLst>
+      <p:ext uri="{BB962C8B-B14F-4D97-AF65-F5344CB8AC3E}">
+        <p14:creationId xmlns:p14="http://schemas.microsoft.com/office/powerpoint/2010/main" val="1681388264"/>
+      </p:ext>
+    </p:extLst>
+  </p:cSld>
+  <p:clrMapOvr>
+    <a:masterClrMapping/>
+  </p:clrMapOvr>
+</p:sld>
+</file>
+
+<file path=ppt/slides/slide9.xml><?xml version="1.0" encoding="utf-8"?>
+<p:sld xmlns:a="http://schemas.openxmlformats.org/drawingml/2006/main" xmlns:r="http://schemas.openxmlformats.org/officeDocument/2006/relationships" xmlns:p="http://schemas.openxmlformats.org/presentationml/2006/main">
+  <p:cSld>
+    <p:spTree>
+      <p:nvGrpSpPr>
+        <p:cNvPr id="1" name=""/>
+        <p:cNvGrpSpPr/>
+        <p:nvPr/>
+      </p:nvGrpSpPr>
+      <p:grpSpPr>
+        <a:xfrm>
+          <a:off x="0" y="0"/>
+          <a:ext cx="0" cy="0"/>
+          <a:chOff x="0" y="0"/>
+          <a:chExt cx="0" cy="0"/>
+        </a:xfrm>
+      </p:grpSpPr>
+      <p:sp>
+        <p:nvSpPr>
+          <p:cNvPr id="2" name="Titel 1">
+            <a:extLst>
+              <a:ext uri="{FF2B5EF4-FFF2-40B4-BE49-F238E27FC236}">
+                <a16:creationId xmlns:a16="http://schemas.microsoft.com/office/drawing/2014/main" id="{62F14DB5-6288-49EC-85DB-36DACB1EE0C4}"/>
+              </a:ext>
+            </a:extLst>
+          </p:cNvPr>
+          <p:cNvSpPr>
+            <a:spLocks noGrp="1"/>
+          </p:cNvSpPr>
+          <p:nvPr>
+            <p:ph type="title"/>
+          </p:nvPr>
+        </p:nvSpPr>
+        <p:spPr/>
+        <p:txBody>
+          <a:bodyPr/>
+          <a:lstStyle/>
+          <a:p>
+            <a:r>
+              <a:rPr lang="de-DE" dirty="0" err="1"/>
+              <a:t>Lessons</a:t>
+            </a:r>
+            <a:r>
+              <a:rPr lang="de-DE" dirty="0"/>
+              <a:t> </a:t>
+            </a:r>
+            <a:r>
+              <a:rPr lang="de-DE" dirty="0" err="1"/>
+              <a:t>Learned</a:t>
+            </a:r>
+            <a:endParaRPr lang="de-DE" dirty="0"/>
+          </a:p>
+        </p:txBody>
+      </p:sp>
+      <p:sp>
+        <p:nvSpPr>
+          <p:cNvPr id="3" name="Inhaltsplatzhalter 2">
+            <a:extLst>
+              <a:ext uri="{FF2B5EF4-FFF2-40B4-BE49-F238E27FC236}">
+                <a16:creationId xmlns:a16="http://schemas.microsoft.com/office/drawing/2014/main" id="{D05EB91A-C650-434F-B579-8F362D609943}"/>
+              </a:ext>
+            </a:extLst>
+          </p:cNvPr>
+          <p:cNvSpPr>
+            <a:spLocks noGrp="1"/>
+          </p:cNvSpPr>
+          <p:nvPr>
+            <p:ph idx="1"/>
+          </p:nvPr>
+        </p:nvSpPr>
+        <p:spPr/>
+        <p:txBody>
+          <a:bodyPr>
+            <a:normAutofit/>
+          </a:bodyPr>
+          <a:lstStyle/>
+          <a:p>
+            <a:r>
+              <a:rPr lang="de-DE" dirty="0"/>
+              <a:t>Gruppenarbeit ist kompliziert</a:t>
+            </a:r>
+          </a:p>
+          <a:p>
+            <a:r>
+              <a:rPr lang="de-DE" dirty="0"/>
+              <a:t>Gruppenarbeit ist wichtig, weil wir viel voneinander gelernt haben</a:t>
+            </a:r>
+          </a:p>
+          <a:p>
+            <a:r>
+              <a:rPr lang="de-DE" dirty="0"/>
+              <a:t>Gegenseitig geholfen bei Herausforderungen</a:t>
+            </a:r>
+          </a:p>
+          <a:p>
+            <a:r>
+              <a:rPr lang="de-DE" dirty="0"/>
+              <a:t>Herausforderung durch das Online-Semester (Kommunikation und Koordination)</a:t>
+            </a:r>
+          </a:p>
+          <a:p>
+            <a:r>
+              <a:rPr lang="de-DE" dirty="0"/>
+              <a:t>Wir haben das Projekt ohne Sanktionen durchgestanden</a:t>
+            </a:r>
+          </a:p>
+          <a:p>
+            <a:r>
+              <a:rPr lang="de-DE" dirty="0"/>
+              <a:t>Gute Protokollführung ist sehr wichtig</a:t>
+            </a:r>
+          </a:p>
+          <a:p>
+            <a:endParaRPr lang="de-DE" dirty="0"/>
+          </a:p>
+        </p:txBody>
+      </p:sp>
+    </p:spTree>
+    <p:extLst>
+      <p:ext uri="{BB962C8B-B14F-4D97-AF65-F5344CB8AC3E}">
+        <p14:creationId xmlns:p14="http://schemas.microsoft.com/office/powerpoint/2010/main" val="2457349450"/>
+      </p:ext>
+    </p:extLst>
+  </p:cSld>
+  <p:clrMapOvr>
+    <a:masterClrMapping/>
   </p:clrMapOvr>
 </p:sld>
 </file>

</xml_diff>